<commit_message>
add showtext as needed package - plus add missing elements in the pptx template
</commit_message>
<xml_diff>
--- a/inst/resources/templates/pptx_template.pptx
+++ b/inst/resources/templates/pptx_template.pptx
@@ -215,7 +215,7 @@
           <a:p>
             <a:fld id="{468012B1-E1DC-4352-8B1C-5C2DD5160B3B}" type="datetimeFigureOut">
               <a:rPr lang="en-US" smtClean="0"/>
-              <a:t>11/21/2024</a:t>
+              <a:t>1/3/2025</a:t>
             </a:fld>
             <a:endParaRPr lang="en-US"/>
           </a:p>
@@ -392,7 +392,7 @@
           <a:p>
             <a:fld id="{F3696079-EBA5-8C41-96F3-032D52D44482}" type="datetimeFigureOut">
               <a:rPr lang="en-US" smtClean="0"/>
-              <a:t>11/21/2024</a:t>
+              <a:t>1/3/2025</a:t>
             </a:fld>
             <a:endParaRPr lang="en-US"/>
           </a:p>
@@ -960,6 +960,151 @@
 </p:sldLayout>
 </file>
 
+<file path=ppt/slideLayouts/slideLayout10.xml><?xml version="1.0" encoding="utf-8"?>
+<p:sldLayout xmlns:a="http://schemas.openxmlformats.org/drawingml/2006/main" xmlns:r="http://schemas.openxmlformats.org/officeDocument/2006/relationships" xmlns:p="http://schemas.openxmlformats.org/presentationml/2006/main" type="blank" preserve="1">
+  <p:cSld name="Blank">
+    <p:spTree>
+      <p:nvGrpSpPr>
+        <p:cNvPr id="1" name=""/>
+        <p:cNvGrpSpPr/>
+        <p:nvPr/>
+      </p:nvGrpSpPr>
+      <p:grpSpPr>
+        <a:xfrm>
+          <a:off x="0" y="0"/>
+          <a:ext cx="0" cy="0"/>
+          <a:chOff x="0" y="0"/>
+          <a:chExt cx="0" cy="0"/>
+        </a:xfrm>
+      </p:grpSpPr>
+    </p:spTree>
+    <p:extLst>
+      <p:ext uri="{BB962C8B-B14F-4D97-AF65-F5344CB8AC3E}">
+        <p14:creationId xmlns:p14="http://schemas.microsoft.com/office/powerpoint/2010/main" val="3120978144"/>
+      </p:ext>
+    </p:extLst>
+  </p:cSld>
+  <p:clrMapOvr>
+    <a:masterClrMapping/>
+  </p:clrMapOvr>
+</p:sldLayout>
+</file>
+
+<file path=ppt/slideLayouts/slideLayout11.xml><?xml version="1.0" encoding="utf-8"?>
+<p:sldLayout xmlns:a="http://schemas.openxmlformats.org/drawingml/2006/main" xmlns:r="http://schemas.openxmlformats.org/officeDocument/2006/relationships" xmlns:p="http://schemas.openxmlformats.org/presentationml/2006/main" type="vertTx" preserve="1">
+  <p:cSld name="Title and Vertical Text">
+    <p:spTree>
+      <p:nvGrpSpPr>
+        <p:cNvPr id="1" name=""/>
+        <p:cNvGrpSpPr/>
+        <p:nvPr/>
+      </p:nvGrpSpPr>
+      <p:grpSpPr>
+        <a:xfrm>
+          <a:off x="0" y="0"/>
+          <a:ext cx="0" cy="0"/>
+          <a:chOff x="0" y="0"/>
+          <a:chExt cx="0" cy="0"/>
+        </a:xfrm>
+      </p:grpSpPr>
+      <p:sp>
+        <p:nvSpPr>
+          <p:cNvPr id="2" name="Title 1">
+            <a:extLst>
+              <a:ext uri="{FF2B5EF4-FFF2-40B4-BE49-F238E27FC236}">
+                <a16:creationId xmlns:a16="http://schemas.microsoft.com/office/drawing/2014/main" id="{8A469ED6-DF88-1B2B-9327-C34889D3C927}"/>
+              </a:ext>
+            </a:extLst>
+          </p:cNvPr>
+          <p:cNvSpPr>
+            <a:spLocks noGrp="1"/>
+          </p:cNvSpPr>
+          <p:nvPr>
+            <p:ph type="title"/>
+          </p:nvPr>
+        </p:nvSpPr>
+        <p:spPr/>
+        <p:txBody>
+          <a:bodyPr/>
+          <a:lstStyle/>
+          <a:p>
+            <a:r>
+              <a:rPr lang="en-US"/>
+              <a:t>Click to edit Master title style</a:t>
+            </a:r>
+          </a:p>
+        </p:txBody>
+      </p:sp>
+      <p:sp>
+        <p:nvSpPr>
+          <p:cNvPr id="3" name="Vertical Text Placeholder 2">
+            <a:extLst>
+              <a:ext uri="{FF2B5EF4-FFF2-40B4-BE49-F238E27FC236}">
+                <a16:creationId xmlns:a16="http://schemas.microsoft.com/office/drawing/2014/main" id="{618C7124-E854-7447-34E1-B81AC67EB59A}"/>
+              </a:ext>
+            </a:extLst>
+          </p:cNvPr>
+          <p:cNvSpPr>
+            <a:spLocks noGrp="1"/>
+          </p:cNvSpPr>
+          <p:nvPr>
+            <p:ph type="body" orient="vert" idx="1"/>
+          </p:nvPr>
+        </p:nvSpPr>
+        <p:spPr/>
+        <p:txBody>
+          <a:bodyPr vert="eaVert"/>
+          <a:lstStyle/>
+          <a:p>
+            <a:pPr lvl="0"/>
+            <a:r>
+              <a:rPr lang="en-US"/>
+              <a:t>Click to edit Master text styles</a:t>
+            </a:r>
+          </a:p>
+          <a:p>
+            <a:pPr lvl="1"/>
+            <a:r>
+              <a:rPr lang="en-US"/>
+              <a:t>Second level</a:t>
+            </a:r>
+          </a:p>
+          <a:p>
+            <a:pPr lvl="2"/>
+            <a:r>
+              <a:rPr lang="en-US"/>
+              <a:t>Third level</a:t>
+            </a:r>
+          </a:p>
+          <a:p>
+            <a:pPr lvl="3"/>
+            <a:r>
+              <a:rPr lang="en-US"/>
+              <a:t>Fourth level</a:t>
+            </a:r>
+          </a:p>
+          <a:p>
+            <a:pPr lvl="4"/>
+            <a:r>
+              <a:rPr lang="en-US"/>
+              <a:t>Fifth level</a:t>
+            </a:r>
+          </a:p>
+        </p:txBody>
+      </p:sp>
+    </p:spTree>
+    <p:extLst>
+      <p:ext uri="{BB962C8B-B14F-4D97-AF65-F5344CB8AC3E}">
+        <p14:creationId xmlns:p14="http://schemas.microsoft.com/office/powerpoint/2010/main" val="1975730222"/>
+      </p:ext>
+    </p:extLst>
+  </p:cSld>
+  <p:clrMapOvr>
+    <a:masterClrMapping/>
+  </p:clrMapOvr>
+</p:sldLayout>
+</file>
+
 <file path=ppt/slideLayouts/slideLayout2.xml><?xml version="1.0" encoding="utf-8"?>
 <p:sldLayout xmlns:a="http://schemas.openxmlformats.org/drawingml/2006/main" xmlns:r="http://schemas.openxmlformats.org/officeDocument/2006/relationships" xmlns:p="http://schemas.openxmlformats.org/presentationml/2006/main" preserve="1" userDrawn="1">
   <p:cSld name="Title and Content">
@@ -1642,6 +1787,1200 @@
 </p:sldLayout>
 </file>
 
+<file path=ppt/slideLayouts/slideLayout5.xml><?xml version="1.0" encoding="utf-8"?>
+<p:sldLayout xmlns:a="http://schemas.openxmlformats.org/drawingml/2006/main" xmlns:r="http://schemas.openxmlformats.org/officeDocument/2006/relationships" xmlns:p="http://schemas.openxmlformats.org/presentationml/2006/main" type="twoTxTwoObj" preserve="1">
+  <p:cSld name="Comparison">
+    <p:spTree>
+      <p:nvGrpSpPr>
+        <p:cNvPr id="1" name=""/>
+        <p:cNvGrpSpPr/>
+        <p:nvPr/>
+      </p:nvGrpSpPr>
+      <p:grpSpPr>
+        <a:xfrm>
+          <a:off x="0" y="0"/>
+          <a:ext cx="0" cy="0"/>
+          <a:chOff x="0" y="0"/>
+          <a:chExt cx="0" cy="0"/>
+        </a:xfrm>
+      </p:grpSpPr>
+      <p:sp>
+        <p:nvSpPr>
+          <p:cNvPr id="2" name="Title 1">
+            <a:extLst>
+              <a:ext uri="{FF2B5EF4-FFF2-40B4-BE49-F238E27FC236}">
+                <a16:creationId xmlns:a16="http://schemas.microsoft.com/office/drawing/2014/main" id="{E6DA62FF-D1CC-E512-181C-0714F655C020}"/>
+              </a:ext>
+            </a:extLst>
+          </p:cNvPr>
+          <p:cNvSpPr>
+            <a:spLocks noGrp="1"/>
+          </p:cNvSpPr>
+          <p:nvPr>
+            <p:ph type="title"/>
+          </p:nvPr>
+        </p:nvSpPr>
+        <p:spPr>
+          <a:xfrm>
+            <a:off x="839788" y="365125"/>
+            <a:ext cx="10515600" cy="1325563"/>
+          </a:xfrm>
+        </p:spPr>
+        <p:txBody>
+          <a:bodyPr/>
+          <a:lstStyle/>
+          <a:p>
+            <a:r>
+              <a:rPr lang="en-US"/>
+              <a:t>Click to edit Master title style</a:t>
+            </a:r>
+          </a:p>
+        </p:txBody>
+      </p:sp>
+      <p:sp>
+        <p:nvSpPr>
+          <p:cNvPr id="3" name="Text Placeholder 2">
+            <a:extLst>
+              <a:ext uri="{FF2B5EF4-FFF2-40B4-BE49-F238E27FC236}">
+                <a16:creationId xmlns:a16="http://schemas.microsoft.com/office/drawing/2014/main" id="{974DE648-5394-A879-1872-06DE5A7755F4}"/>
+              </a:ext>
+            </a:extLst>
+          </p:cNvPr>
+          <p:cNvSpPr>
+            <a:spLocks noGrp="1"/>
+          </p:cNvSpPr>
+          <p:nvPr>
+            <p:ph type="body" idx="1"/>
+          </p:nvPr>
+        </p:nvSpPr>
+        <p:spPr>
+          <a:xfrm>
+            <a:off x="839788" y="1681163"/>
+            <a:ext cx="5157787" cy="823912"/>
+          </a:xfrm>
+        </p:spPr>
+        <p:txBody>
+          <a:bodyPr anchor="b"/>
+          <a:lstStyle>
+            <a:lvl1pPr marL="0" indent="0">
+              <a:buNone/>
+              <a:defRPr sz="2400" b="1"/>
+            </a:lvl1pPr>
+            <a:lvl2pPr marL="457200" indent="0">
+              <a:buNone/>
+              <a:defRPr sz="2000" b="1"/>
+            </a:lvl2pPr>
+            <a:lvl3pPr marL="914400" indent="0">
+              <a:buNone/>
+              <a:defRPr sz="1800" b="1"/>
+            </a:lvl3pPr>
+            <a:lvl4pPr marL="1371600" indent="0">
+              <a:buNone/>
+              <a:defRPr sz="1600" b="1"/>
+            </a:lvl4pPr>
+            <a:lvl5pPr marL="1828800" indent="0">
+              <a:buNone/>
+              <a:defRPr sz="1600" b="1"/>
+            </a:lvl5pPr>
+            <a:lvl6pPr marL="2286000" indent="0">
+              <a:buNone/>
+              <a:defRPr sz="1600" b="1"/>
+            </a:lvl6pPr>
+            <a:lvl7pPr marL="2743200" indent="0">
+              <a:buNone/>
+              <a:defRPr sz="1600" b="1"/>
+            </a:lvl7pPr>
+            <a:lvl8pPr marL="3200400" indent="0">
+              <a:buNone/>
+              <a:defRPr sz="1600" b="1"/>
+            </a:lvl8pPr>
+            <a:lvl9pPr marL="3657600" indent="0">
+              <a:buNone/>
+              <a:defRPr sz="1600" b="1"/>
+            </a:lvl9pPr>
+          </a:lstStyle>
+          <a:p>
+            <a:pPr lvl="0"/>
+            <a:r>
+              <a:rPr lang="en-US"/>
+              <a:t>Click to edit Master text styles</a:t>
+            </a:r>
+          </a:p>
+        </p:txBody>
+      </p:sp>
+      <p:sp>
+        <p:nvSpPr>
+          <p:cNvPr id="4" name="Content Placeholder 3">
+            <a:extLst>
+              <a:ext uri="{FF2B5EF4-FFF2-40B4-BE49-F238E27FC236}">
+                <a16:creationId xmlns:a16="http://schemas.microsoft.com/office/drawing/2014/main" id="{E904F550-E4F2-29A1-AAED-FBA06007E334}"/>
+              </a:ext>
+            </a:extLst>
+          </p:cNvPr>
+          <p:cNvSpPr>
+            <a:spLocks noGrp="1"/>
+          </p:cNvSpPr>
+          <p:nvPr>
+            <p:ph sz="half" idx="2"/>
+          </p:nvPr>
+        </p:nvSpPr>
+        <p:spPr>
+          <a:xfrm>
+            <a:off x="839788" y="2505075"/>
+            <a:ext cx="5157787" cy="3684588"/>
+          </a:xfrm>
+        </p:spPr>
+        <p:txBody>
+          <a:bodyPr/>
+          <a:lstStyle/>
+          <a:p>
+            <a:pPr lvl="0"/>
+            <a:r>
+              <a:rPr lang="en-US"/>
+              <a:t>Click to edit Master text styles</a:t>
+            </a:r>
+          </a:p>
+          <a:p>
+            <a:pPr lvl="1"/>
+            <a:r>
+              <a:rPr lang="en-US"/>
+              <a:t>Second level</a:t>
+            </a:r>
+          </a:p>
+          <a:p>
+            <a:pPr lvl="2"/>
+            <a:r>
+              <a:rPr lang="en-US"/>
+              <a:t>Third level</a:t>
+            </a:r>
+          </a:p>
+          <a:p>
+            <a:pPr lvl="3"/>
+            <a:r>
+              <a:rPr lang="en-US"/>
+              <a:t>Fourth level</a:t>
+            </a:r>
+          </a:p>
+          <a:p>
+            <a:pPr lvl="4"/>
+            <a:r>
+              <a:rPr lang="en-US"/>
+              <a:t>Fifth level</a:t>
+            </a:r>
+          </a:p>
+        </p:txBody>
+      </p:sp>
+      <p:sp>
+        <p:nvSpPr>
+          <p:cNvPr id="5" name="Text Placeholder 4">
+            <a:extLst>
+              <a:ext uri="{FF2B5EF4-FFF2-40B4-BE49-F238E27FC236}">
+                <a16:creationId xmlns:a16="http://schemas.microsoft.com/office/drawing/2014/main" id="{09982D79-AAFA-54E0-99FD-8B86209101FB}"/>
+              </a:ext>
+            </a:extLst>
+          </p:cNvPr>
+          <p:cNvSpPr>
+            <a:spLocks noGrp="1"/>
+          </p:cNvSpPr>
+          <p:nvPr>
+            <p:ph type="body" sz="quarter" idx="3"/>
+          </p:nvPr>
+        </p:nvSpPr>
+        <p:spPr>
+          <a:xfrm>
+            <a:off x="6172200" y="1681163"/>
+            <a:ext cx="5183188" cy="823912"/>
+          </a:xfrm>
+        </p:spPr>
+        <p:txBody>
+          <a:bodyPr anchor="b"/>
+          <a:lstStyle>
+            <a:lvl1pPr marL="0" indent="0">
+              <a:buNone/>
+              <a:defRPr sz="2400" b="1"/>
+            </a:lvl1pPr>
+            <a:lvl2pPr marL="457200" indent="0">
+              <a:buNone/>
+              <a:defRPr sz="2000" b="1"/>
+            </a:lvl2pPr>
+            <a:lvl3pPr marL="914400" indent="0">
+              <a:buNone/>
+              <a:defRPr sz="1800" b="1"/>
+            </a:lvl3pPr>
+            <a:lvl4pPr marL="1371600" indent="0">
+              <a:buNone/>
+              <a:defRPr sz="1600" b="1"/>
+            </a:lvl4pPr>
+            <a:lvl5pPr marL="1828800" indent="0">
+              <a:buNone/>
+              <a:defRPr sz="1600" b="1"/>
+            </a:lvl5pPr>
+            <a:lvl6pPr marL="2286000" indent="0">
+              <a:buNone/>
+              <a:defRPr sz="1600" b="1"/>
+            </a:lvl6pPr>
+            <a:lvl7pPr marL="2743200" indent="0">
+              <a:buNone/>
+              <a:defRPr sz="1600" b="1"/>
+            </a:lvl7pPr>
+            <a:lvl8pPr marL="3200400" indent="0">
+              <a:buNone/>
+              <a:defRPr sz="1600" b="1"/>
+            </a:lvl8pPr>
+            <a:lvl9pPr marL="3657600" indent="0">
+              <a:buNone/>
+              <a:defRPr sz="1600" b="1"/>
+            </a:lvl9pPr>
+          </a:lstStyle>
+          <a:p>
+            <a:pPr lvl="0"/>
+            <a:r>
+              <a:rPr lang="en-US"/>
+              <a:t>Click to edit Master text styles</a:t>
+            </a:r>
+          </a:p>
+        </p:txBody>
+      </p:sp>
+      <p:sp>
+        <p:nvSpPr>
+          <p:cNvPr id="6" name="Content Placeholder 5">
+            <a:extLst>
+              <a:ext uri="{FF2B5EF4-FFF2-40B4-BE49-F238E27FC236}">
+                <a16:creationId xmlns:a16="http://schemas.microsoft.com/office/drawing/2014/main" id="{4CCEBF9C-6422-7BAD-D306-44717CDF77A5}"/>
+              </a:ext>
+            </a:extLst>
+          </p:cNvPr>
+          <p:cNvSpPr>
+            <a:spLocks noGrp="1"/>
+          </p:cNvSpPr>
+          <p:nvPr>
+            <p:ph sz="quarter" idx="4"/>
+          </p:nvPr>
+        </p:nvSpPr>
+        <p:spPr>
+          <a:xfrm>
+            <a:off x="6172200" y="2505075"/>
+            <a:ext cx="5183188" cy="3684588"/>
+          </a:xfrm>
+        </p:spPr>
+        <p:txBody>
+          <a:bodyPr/>
+          <a:lstStyle/>
+          <a:p>
+            <a:pPr lvl="0"/>
+            <a:r>
+              <a:rPr lang="en-US"/>
+              <a:t>Click to edit Master text styles</a:t>
+            </a:r>
+          </a:p>
+          <a:p>
+            <a:pPr lvl="1"/>
+            <a:r>
+              <a:rPr lang="en-US"/>
+              <a:t>Second level</a:t>
+            </a:r>
+          </a:p>
+          <a:p>
+            <a:pPr lvl="2"/>
+            <a:r>
+              <a:rPr lang="en-US"/>
+              <a:t>Third level</a:t>
+            </a:r>
+          </a:p>
+          <a:p>
+            <a:pPr lvl="3"/>
+            <a:r>
+              <a:rPr lang="en-US"/>
+              <a:t>Fourth level</a:t>
+            </a:r>
+          </a:p>
+          <a:p>
+            <a:pPr lvl="4"/>
+            <a:r>
+              <a:rPr lang="en-US"/>
+              <a:t>Fifth level</a:t>
+            </a:r>
+          </a:p>
+        </p:txBody>
+      </p:sp>
+      <p:sp>
+        <p:nvSpPr>
+          <p:cNvPr id="7" name="Date Placeholder 6">
+            <a:extLst>
+              <a:ext uri="{FF2B5EF4-FFF2-40B4-BE49-F238E27FC236}">
+                <a16:creationId xmlns:a16="http://schemas.microsoft.com/office/drawing/2014/main" id="{1DB1BA83-9735-AD7B-32D4-374CFF1E2176}"/>
+              </a:ext>
+            </a:extLst>
+          </p:cNvPr>
+          <p:cNvSpPr>
+            <a:spLocks noGrp="1"/>
+          </p:cNvSpPr>
+          <p:nvPr>
+            <p:ph type="dt" sz="half" idx="10"/>
+          </p:nvPr>
+        </p:nvSpPr>
+        <p:spPr/>
+        <p:txBody>
+          <a:bodyPr/>
+          <a:lstStyle/>
+          <a:p>
+            <a:fld id="{33BF66BF-0DEC-407C-AE01-7E9C7D5CA779}" type="datetimeFigureOut">
+              <a:rPr lang="en-US" smtClean="0"/>
+              <a:t>1/3/2025</a:t>
+            </a:fld>
+            <a:endParaRPr lang="en-US"/>
+          </a:p>
+        </p:txBody>
+      </p:sp>
+      <p:sp>
+        <p:nvSpPr>
+          <p:cNvPr id="8" name="Footer Placeholder 7">
+            <a:extLst>
+              <a:ext uri="{FF2B5EF4-FFF2-40B4-BE49-F238E27FC236}">
+                <a16:creationId xmlns:a16="http://schemas.microsoft.com/office/drawing/2014/main" id="{3016938F-E4E0-9005-AF3B-4927D72B7DD7}"/>
+              </a:ext>
+            </a:extLst>
+          </p:cNvPr>
+          <p:cNvSpPr>
+            <a:spLocks noGrp="1"/>
+          </p:cNvSpPr>
+          <p:nvPr>
+            <p:ph type="ftr" sz="quarter" idx="11"/>
+          </p:nvPr>
+        </p:nvSpPr>
+        <p:spPr/>
+        <p:txBody>
+          <a:bodyPr/>
+          <a:lstStyle/>
+          <a:p>
+            <a:endParaRPr lang="en-US"/>
+          </a:p>
+        </p:txBody>
+      </p:sp>
+      <p:sp>
+        <p:nvSpPr>
+          <p:cNvPr id="9" name="Slide Number Placeholder 8">
+            <a:extLst>
+              <a:ext uri="{FF2B5EF4-FFF2-40B4-BE49-F238E27FC236}">
+                <a16:creationId xmlns:a16="http://schemas.microsoft.com/office/drawing/2014/main" id="{9FCAED3B-E566-A2DC-E895-77401C1A2BA0}"/>
+              </a:ext>
+            </a:extLst>
+          </p:cNvPr>
+          <p:cNvSpPr>
+            <a:spLocks noGrp="1"/>
+          </p:cNvSpPr>
+          <p:nvPr>
+            <p:ph type="sldNum" sz="quarter" idx="12"/>
+          </p:nvPr>
+        </p:nvSpPr>
+        <p:spPr/>
+        <p:txBody>
+          <a:bodyPr/>
+          <a:lstStyle/>
+          <a:p>
+            <a:fld id="{EB99CDBE-BBE2-4CAF-B340-04F251F10DB4}" type="slidenum">
+              <a:rPr lang="en-US" smtClean="0"/>
+              <a:t>‹#›</a:t>
+            </a:fld>
+            <a:endParaRPr lang="en-US"/>
+          </a:p>
+        </p:txBody>
+      </p:sp>
+    </p:spTree>
+    <p:extLst>
+      <p:ext uri="{BB962C8B-B14F-4D97-AF65-F5344CB8AC3E}">
+        <p14:creationId xmlns:p14="http://schemas.microsoft.com/office/powerpoint/2010/main" val="3545874706"/>
+      </p:ext>
+    </p:extLst>
+  </p:cSld>
+  <p:clrMapOvr>
+    <a:masterClrMapping/>
+  </p:clrMapOvr>
+</p:sldLayout>
+</file>
+
+<file path=ppt/slideLayouts/slideLayout6.xml><?xml version="1.0" encoding="utf-8"?>
+<p:sldLayout xmlns:a="http://schemas.openxmlformats.org/drawingml/2006/main" xmlns:r="http://schemas.openxmlformats.org/officeDocument/2006/relationships" xmlns:p="http://schemas.openxmlformats.org/presentationml/2006/main" type="titleOnly" preserve="1">
+  <p:cSld name="Title Only">
+    <p:spTree>
+      <p:nvGrpSpPr>
+        <p:cNvPr id="1" name=""/>
+        <p:cNvGrpSpPr/>
+        <p:nvPr/>
+      </p:nvGrpSpPr>
+      <p:grpSpPr>
+        <a:xfrm>
+          <a:off x="0" y="0"/>
+          <a:ext cx="0" cy="0"/>
+          <a:chOff x="0" y="0"/>
+          <a:chExt cx="0" cy="0"/>
+        </a:xfrm>
+      </p:grpSpPr>
+      <p:sp>
+        <p:nvSpPr>
+          <p:cNvPr id="2" name="Title 1">
+            <a:extLst>
+              <a:ext uri="{FF2B5EF4-FFF2-40B4-BE49-F238E27FC236}">
+                <a16:creationId xmlns:a16="http://schemas.microsoft.com/office/drawing/2014/main" id="{BA0FC060-7C60-DCA0-9053-541F5C6BEA84}"/>
+              </a:ext>
+            </a:extLst>
+          </p:cNvPr>
+          <p:cNvSpPr>
+            <a:spLocks noGrp="1"/>
+          </p:cNvSpPr>
+          <p:nvPr>
+            <p:ph type="title"/>
+          </p:nvPr>
+        </p:nvSpPr>
+        <p:spPr/>
+        <p:txBody>
+          <a:bodyPr/>
+          <a:lstStyle/>
+          <a:p>
+            <a:r>
+              <a:rPr lang="en-US"/>
+              <a:t>Click to edit Master title style</a:t>
+            </a:r>
+          </a:p>
+        </p:txBody>
+      </p:sp>
+      <p:sp>
+        <p:nvSpPr>
+          <p:cNvPr id="3" name="Date Placeholder 2">
+            <a:extLst>
+              <a:ext uri="{FF2B5EF4-FFF2-40B4-BE49-F238E27FC236}">
+                <a16:creationId xmlns:a16="http://schemas.microsoft.com/office/drawing/2014/main" id="{35E00018-D759-F301-5F6C-93B14AC87955}"/>
+              </a:ext>
+            </a:extLst>
+          </p:cNvPr>
+          <p:cNvSpPr>
+            <a:spLocks noGrp="1"/>
+          </p:cNvSpPr>
+          <p:nvPr>
+            <p:ph type="dt" sz="half" idx="10"/>
+          </p:nvPr>
+        </p:nvSpPr>
+        <p:spPr/>
+        <p:txBody>
+          <a:bodyPr/>
+          <a:lstStyle/>
+          <a:p>
+            <a:fld id="{33BF66BF-0DEC-407C-AE01-7E9C7D5CA779}" type="datetimeFigureOut">
+              <a:rPr lang="en-US" smtClean="0"/>
+              <a:t>1/3/2025</a:t>
+            </a:fld>
+            <a:endParaRPr lang="en-US"/>
+          </a:p>
+        </p:txBody>
+      </p:sp>
+      <p:sp>
+        <p:nvSpPr>
+          <p:cNvPr id="4" name="Footer Placeholder 3">
+            <a:extLst>
+              <a:ext uri="{FF2B5EF4-FFF2-40B4-BE49-F238E27FC236}">
+                <a16:creationId xmlns:a16="http://schemas.microsoft.com/office/drawing/2014/main" id="{54C9C836-B40B-4DAD-0B5B-3B5661BF93F5}"/>
+              </a:ext>
+            </a:extLst>
+          </p:cNvPr>
+          <p:cNvSpPr>
+            <a:spLocks noGrp="1"/>
+          </p:cNvSpPr>
+          <p:nvPr>
+            <p:ph type="ftr" sz="quarter" idx="11"/>
+          </p:nvPr>
+        </p:nvSpPr>
+        <p:spPr/>
+        <p:txBody>
+          <a:bodyPr/>
+          <a:lstStyle/>
+          <a:p>
+            <a:endParaRPr lang="en-US"/>
+          </a:p>
+        </p:txBody>
+      </p:sp>
+      <p:sp>
+        <p:nvSpPr>
+          <p:cNvPr id="5" name="Slide Number Placeholder 4">
+            <a:extLst>
+              <a:ext uri="{FF2B5EF4-FFF2-40B4-BE49-F238E27FC236}">
+                <a16:creationId xmlns:a16="http://schemas.microsoft.com/office/drawing/2014/main" id="{1CBCBD91-7624-D1BF-0633-6E03A81806CE}"/>
+              </a:ext>
+            </a:extLst>
+          </p:cNvPr>
+          <p:cNvSpPr>
+            <a:spLocks noGrp="1"/>
+          </p:cNvSpPr>
+          <p:nvPr>
+            <p:ph type="sldNum" sz="quarter" idx="12"/>
+          </p:nvPr>
+        </p:nvSpPr>
+        <p:spPr/>
+        <p:txBody>
+          <a:bodyPr/>
+          <a:lstStyle/>
+          <a:p>
+            <a:fld id="{EB99CDBE-BBE2-4CAF-B340-04F251F10DB4}" type="slidenum">
+              <a:rPr lang="en-US" smtClean="0"/>
+              <a:t>‹#›</a:t>
+            </a:fld>
+            <a:endParaRPr lang="en-US"/>
+          </a:p>
+        </p:txBody>
+      </p:sp>
+    </p:spTree>
+    <p:extLst>
+      <p:ext uri="{BB962C8B-B14F-4D97-AF65-F5344CB8AC3E}">
+        <p14:creationId xmlns:p14="http://schemas.microsoft.com/office/powerpoint/2010/main" val="2585398664"/>
+      </p:ext>
+    </p:extLst>
+  </p:cSld>
+  <p:clrMapOvr>
+    <a:masterClrMapping/>
+  </p:clrMapOvr>
+</p:sldLayout>
+</file>
+
+<file path=ppt/slideLayouts/slideLayout7.xml><?xml version="1.0" encoding="utf-8"?>
+<p:sldLayout xmlns:a="http://schemas.openxmlformats.org/drawingml/2006/main" xmlns:r="http://schemas.openxmlformats.org/officeDocument/2006/relationships" xmlns:p="http://schemas.openxmlformats.org/presentationml/2006/main" type="objTx" preserve="1">
+  <p:cSld name="Content with Caption">
+    <p:spTree>
+      <p:nvGrpSpPr>
+        <p:cNvPr id="1" name=""/>
+        <p:cNvGrpSpPr/>
+        <p:nvPr/>
+      </p:nvGrpSpPr>
+      <p:grpSpPr>
+        <a:xfrm>
+          <a:off x="0" y="0"/>
+          <a:ext cx="0" cy="0"/>
+          <a:chOff x="0" y="0"/>
+          <a:chExt cx="0" cy="0"/>
+        </a:xfrm>
+      </p:grpSpPr>
+      <p:sp>
+        <p:nvSpPr>
+          <p:cNvPr id="2" name="Title 1">
+            <a:extLst>
+              <a:ext uri="{FF2B5EF4-FFF2-40B4-BE49-F238E27FC236}">
+                <a16:creationId xmlns:a16="http://schemas.microsoft.com/office/drawing/2014/main" id="{29D86A90-4953-947C-5AB9-B5EC415338B6}"/>
+              </a:ext>
+            </a:extLst>
+          </p:cNvPr>
+          <p:cNvSpPr>
+            <a:spLocks noGrp="1"/>
+          </p:cNvSpPr>
+          <p:nvPr>
+            <p:ph type="title"/>
+          </p:nvPr>
+        </p:nvSpPr>
+        <p:spPr>
+          <a:xfrm>
+            <a:off x="839788" y="457200"/>
+            <a:ext cx="3932237" cy="1600200"/>
+          </a:xfrm>
+        </p:spPr>
+        <p:txBody>
+          <a:bodyPr anchor="b"/>
+          <a:lstStyle>
+            <a:lvl1pPr>
+              <a:defRPr sz="3200"/>
+            </a:lvl1pPr>
+          </a:lstStyle>
+          <a:p>
+            <a:r>
+              <a:rPr lang="en-US"/>
+              <a:t>Click to edit Master title style</a:t>
+            </a:r>
+          </a:p>
+        </p:txBody>
+      </p:sp>
+      <p:sp>
+        <p:nvSpPr>
+          <p:cNvPr id="3" name="Content Placeholder 2">
+            <a:extLst>
+              <a:ext uri="{FF2B5EF4-FFF2-40B4-BE49-F238E27FC236}">
+                <a16:creationId xmlns:a16="http://schemas.microsoft.com/office/drawing/2014/main" id="{9F3D96F5-3F65-E8CD-C5E1-1E95322DDAB9}"/>
+              </a:ext>
+            </a:extLst>
+          </p:cNvPr>
+          <p:cNvSpPr>
+            <a:spLocks noGrp="1"/>
+          </p:cNvSpPr>
+          <p:nvPr>
+            <p:ph idx="1"/>
+          </p:nvPr>
+        </p:nvSpPr>
+        <p:spPr>
+          <a:xfrm>
+            <a:off x="5183188" y="987425"/>
+            <a:ext cx="6172200" cy="4873625"/>
+          </a:xfrm>
+        </p:spPr>
+        <p:txBody>
+          <a:bodyPr/>
+          <a:lstStyle>
+            <a:lvl1pPr>
+              <a:defRPr sz="3200"/>
+            </a:lvl1pPr>
+            <a:lvl2pPr>
+              <a:defRPr sz="2800"/>
+            </a:lvl2pPr>
+            <a:lvl3pPr>
+              <a:defRPr sz="2400"/>
+            </a:lvl3pPr>
+            <a:lvl4pPr>
+              <a:defRPr sz="2000"/>
+            </a:lvl4pPr>
+            <a:lvl5pPr>
+              <a:defRPr sz="2000"/>
+            </a:lvl5pPr>
+            <a:lvl6pPr>
+              <a:defRPr sz="2000"/>
+            </a:lvl6pPr>
+            <a:lvl7pPr>
+              <a:defRPr sz="2000"/>
+            </a:lvl7pPr>
+            <a:lvl8pPr>
+              <a:defRPr sz="2000"/>
+            </a:lvl8pPr>
+            <a:lvl9pPr>
+              <a:defRPr sz="2000"/>
+            </a:lvl9pPr>
+          </a:lstStyle>
+          <a:p>
+            <a:pPr lvl="0"/>
+            <a:r>
+              <a:rPr lang="en-US"/>
+              <a:t>Click to edit Master text styles</a:t>
+            </a:r>
+          </a:p>
+          <a:p>
+            <a:pPr lvl="1"/>
+            <a:r>
+              <a:rPr lang="en-US"/>
+              <a:t>Second level</a:t>
+            </a:r>
+          </a:p>
+          <a:p>
+            <a:pPr lvl="2"/>
+            <a:r>
+              <a:rPr lang="en-US"/>
+              <a:t>Third level</a:t>
+            </a:r>
+          </a:p>
+          <a:p>
+            <a:pPr lvl="3"/>
+            <a:r>
+              <a:rPr lang="en-US"/>
+              <a:t>Fourth level</a:t>
+            </a:r>
+          </a:p>
+          <a:p>
+            <a:pPr lvl="4"/>
+            <a:r>
+              <a:rPr lang="en-US"/>
+              <a:t>Fifth level</a:t>
+            </a:r>
+          </a:p>
+        </p:txBody>
+      </p:sp>
+      <p:sp>
+        <p:nvSpPr>
+          <p:cNvPr id="4" name="Text Placeholder 3">
+            <a:extLst>
+              <a:ext uri="{FF2B5EF4-FFF2-40B4-BE49-F238E27FC236}">
+                <a16:creationId xmlns:a16="http://schemas.microsoft.com/office/drawing/2014/main" id="{B78961AB-E1B4-3F84-D4F3-274E9AD135D4}"/>
+              </a:ext>
+            </a:extLst>
+          </p:cNvPr>
+          <p:cNvSpPr>
+            <a:spLocks noGrp="1"/>
+          </p:cNvSpPr>
+          <p:nvPr>
+            <p:ph type="body" sz="half" idx="2"/>
+          </p:nvPr>
+        </p:nvSpPr>
+        <p:spPr>
+          <a:xfrm>
+            <a:off x="839788" y="2057400"/>
+            <a:ext cx="3932237" cy="3811588"/>
+          </a:xfrm>
+        </p:spPr>
+        <p:txBody>
+          <a:bodyPr/>
+          <a:lstStyle>
+            <a:lvl1pPr marL="0" indent="0">
+              <a:buNone/>
+              <a:defRPr sz="1600"/>
+            </a:lvl1pPr>
+            <a:lvl2pPr marL="457200" indent="0">
+              <a:buNone/>
+              <a:defRPr sz="1400"/>
+            </a:lvl2pPr>
+            <a:lvl3pPr marL="914400" indent="0">
+              <a:buNone/>
+              <a:defRPr sz="1200"/>
+            </a:lvl3pPr>
+            <a:lvl4pPr marL="1371600" indent="0">
+              <a:buNone/>
+              <a:defRPr sz="1000"/>
+            </a:lvl4pPr>
+            <a:lvl5pPr marL="1828800" indent="0">
+              <a:buNone/>
+              <a:defRPr sz="1000"/>
+            </a:lvl5pPr>
+            <a:lvl6pPr marL="2286000" indent="0">
+              <a:buNone/>
+              <a:defRPr sz="1000"/>
+            </a:lvl6pPr>
+            <a:lvl7pPr marL="2743200" indent="0">
+              <a:buNone/>
+              <a:defRPr sz="1000"/>
+            </a:lvl7pPr>
+            <a:lvl8pPr marL="3200400" indent="0">
+              <a:buNone/>
+              <a:defRPr sz="1000"/>
+            </a:lvl8pPr>
+            <a:lvl9pPr marL="3657600" indent="0">
+              <a:buNone/>
+              <a:defRPr sz="1000"/>
+            </a:lvl9pPr>
+          </a:lstStyle>
+          <a:p>
+            <a:pPr lvl="0"/>
+            <a:r>
+              <a:rPr lang="en-US"/>
+              <a:t>Click to edit Master text styles</a:t>
+            </a:r>
+          </a:p>
+        </p:txBody>
+      </p:sp>
+      <p:sp>
+        <p:nvSpPr>
+          <p:cNvPr id="5" name="Date Placeholder 4">
+            <a:extLst>
+              <a:ext uri="{FF2B5EF4-FFF2-40B4-BE49-F238E27FC236}">
+                <a16:creationId xmlns:a16="http://schemas.microsoft.com/office/drawing/2014/main" id="{D0FC8867-F4DA-8DB8-1571-717AD9DDC0FA}"/>
+              </a:ext>
+            </a:extLst>
+          </p:cNvPr>
+          <p:cNvSpPr>
+            <a:spLocks noGrp="1"/>
+          </p:cNvSpPr>
+          <p:nvPr>
+            <p:ph type="dt" sz="half" idx="10"/>
+          </p:nvPr>
+        </p:nvSpPr>
+        <p:spPr/>
+        <p:txBody>
+          <a:bodyPr/>
+          <a:lstStyle/>
+          <a:p>
+            <a:fld id="{33BF66BF-0DEC-407C-AE01-7E9C7D5CA779}" type="datetimeFigureOut">
+              <a:rPr lang="en-US" smtClean="0"/>
+              <a:t>1/3/2025</a:t>
+            </a:fld>
+            <a:endParaRPr lang="en-US"/>
+          </a:p>
+        </p:txBody>
+      </p:sp>
+      <p:sp>
+        <p:nvSpPr>
+          <p:cNvPr id="6" name="Footer Placeholder 5">
+            <a:extLst>
+              <a:ext uri="{FF2B5EF4-FFF2-40B4-BE49-F238E27FC236}">
+                <a16:creationId xmlns:a16="http://schemas.microsoft.com/office/drawing/2014/main" id="{486A049A-A59D-22C0-3BD3-F053838DFDBE}"/>
+              </a:ext>
+            </a:extLst>
+          </p:cNvPr>
+          <p:cNvSpPr>
+            <a:spLocks noGrp="1"/>
+          </p:cNvSpPr>
+          <p:nvPr>
+            <p:ph type="ftr" sz="quarter" idx="11"/>
+          </p:nvPr>
+        </p:nvSpPr>
+        <p:spPr/>
+        <p:txBody>
+          <a:bodyPr/>
+          <a:lstStyle/>
+          <a:p>
+            <a:endParaRPr lang="en-US"/>
+          </a:p>
+        </p:txBody>
+      </p:sp>
+      <p:sp>
+        <p:nvSpPr>
+          <p:cNvPr id="7" name="Slide Number Placeholder 6">
+            <a:extLst>
+              <a:ext uri="{FF2B5EF4-FFF2-40B4-BE49-F238E27FC236}">
+                <a16:creationId xmlns:a16="http://schemas.microsoft.com/office/drawing/2014/main" id="{BC5A68B4-F967-E3B5-A2C3-30D37673999A}"/>
+              </a:ext>
+            </a:extLst>
+          </p:cNvPr>
+          <p:cNvSpPr>
+            <a:spLocks noGrp="1"/>
+          </p:cNvSpPr>
+          <p:nvPr>
+            <p:ph type="sldNum" sz="quarter" idx="12"/>
+          </p:nvPr>
+        </p:nvSpPr>
+        <p:spPr/>
+        <p:txBody>
+          <a:bodyPr/>
+          <a:lstStyle/>
+          <a:p>
+            <a:fld id="{EB99CDBE-BBE2-4CAF-B340-04F251F10DB4}" type="slidenum">
+              <a:rPr lang="en-US" smtClean="0"/>
+              <a:t>‹#›</a:t>
+            </a:fld>
+            <a:endParaRPr lang="en-US"/>
+          </a:p>
+        </p:txBody>
+      </p:sp>
+    </p:spTree>
+    <p:extLst>
+      <p:ext uri="{BB962C8B-B14F-4D97-AF65-F5344CB8AC3E}">
+        <p14:creationId xmlns:p14="http://schemas.microsoft.com/office/powerpoint/2010/main" val="2167291211"/>
+      </p:ext>
+    </p:extLst>
+  </p:cSld>
+  <p:clrMapOvr>
+    <a:masterClrMapping/>
+  </p:clrMapOvr>
+</p:sldLayout>
+</file>
+
+<file path=ppt/slideLayouts/slideLayout8.xml><?xml version="1.0" encoding="utf-8"?>
+<p:sldLayout xmlns:a="http://schemas.openxmlformats.org/drawingml/2006/main" xmlns:r="http://schemas.openxmlformats.org/officeDocument/2006/relationships" xmlns:p="http://schemas.openxmlformats.org/presentationml/2006/main" type="picTx" preserve="1">
+  <p:cSld name="Picture with Caption">
+    <p:spTree>
+      <p:nvGrpSpPr>
+        <p:cNvPr id="1" name=""/>
+        <p:cNvGrpSpPr/>
+        <p:nvPr/>
+      </p:nvGrpSpPr>
+      <p:grpSpPr>
+        <a:xfrm>
+          <a:off x="0" y="0"/>
+          <a:ext cx="0" cy="0"/>
+          <a:chOff x="0" y="0"/>
+          <a:chExt cx="0" cy="0"/>
+        </a:xfrm>
+      </p:grpSpPr>
+      <p:sp>
+        <p:nvSpPr>
+          <p:cNvPr id="2" name="Title 1">
+            <a:extLst>
+              <a:ext uri="{FF2B5EF4-FFF2-40B4-BE49-F238E27FC236}">
+                <a16:creationId xmlns:a16="http://schemas.microsoft.com/office/drawing/2014/main" id="{CE9A4B8A-8409-D48D-332C-91BD5D0AF839}"/>
+              </a:ext>
+            </a:extLst>
+          </p:cNvPr>
+          <p:cNvSpPr>
+            <a:spLocks noGrp="1"/>
+          </p:cNvSpPr>
+          <p:nvPr>
+            <p:ph type="title"/>
+          </p:nvPr>
+        </p:nvSpPr>
+        <p:spPr>
+          <a:xfrm>
+            <a:off x="839788" y="457200"/>
+            <a:ext cx="3932237" cy="1600200"/>
+          </a:xfrm>
+        </p:spPr>
+        <p:txBody>
+          <a:bodyPr anchor="b"/>
+          <a:lstStyle>
+            <a:lvl1pPr>
+              <a:defRPr sz="3200"/>
+            </a:lvl1pPr>
+          </a:lstStyle>
+          <a:p>
+            <a:r>
+              <a:rPr lang="en-US"/>
+              <a:t>Click to edit Master title style</a:t>
+            </a:r>
+          </a:p>
+        </p:txBody>
+      </p:sp>
+      <p:sp>
+        <p:nvSpPr>
+          <p:cNvPr id="3" name="Picture Placeholder 2">
+            <a:extLst>
+              <a:ext uri="{FF2B5EF4-FFF2-40B4-BE49-F238E27FC236}">
+                <a16:creationId xmlns:a16="http://schemas.microsoft.com/office/drawing/2014/main" id="{C42BE0AB-92E5-EFB1-8F54-80E52636B3F2}"/>
+              </a:ext>
+            </a:extLst>
+          </p:cNvPr>
+          <p:cNvSpPr>
+            <a:spLocks noGrp="1"/>
+          </p:cNvSpPr>
+          <p:nvPr>
+            <p:ph type="pic" idx="1"/>
+          </p:nvPr>
+        </p:nvSpPr>
+        <p:spPr>
+          <a:xfrm>
+            <a:off x="5183188" y="987425"/>
+            <a:ext cx="6172200" cy="4873625"/>
+          </a:xfrm>
+        </p:spPr>
+        <p:txBody>
+          <a:bodyPr/>
+          <a:lstStyle>
+            <a:lvl1pPr marL="0" indent="0">
+              <a:buNone/>
+              <a:defRPr sz="3200"/>
+            </a:lvl1pPr>
+            <a:lvl2pPr marL="457200" indent="0">
+              <a:buNone/>
+              <a:defRPr sz="2800"/>
+            </a:lvl2pPr>
+            <a:lvl3pPr marL="914400" indent="0">
+              <a:buNone/>
+              <a:defRPr sz="2400"/>
+            </a:lvl3pPr>
+            <a:lvl4pPr marL="1371600" indent="0">
+              <a:buNone/>
+              <a:defRPr sz="2000"/>
+            </a:lvl4pPr>
+            <a:lvl5pPr marL="1828800" indent="0">
+              <a:buNone/>
+              <a:defRPr sz="2000"/>
+            </a:lvl5pPr>
+            <a:lvl6pPr marL="2286000" indent="0">
+              <a:buNone/>
+              <a:defRPr sz="2000"/>
+            </a:lvl6pPr>
+            <a:lvl7pPr marL="2743200" indent="0">
+              <a:buNone/>
+              <a:defRPr sz="2000"/>
+            </a:lvl7pPr>
+            <a:lvl8pPr marL="3200400" indent="0">
+              <a:buNone/>
+              <a:defRPr sz="2000"/>
+            </a:lvl8pPr>
+            <a:lvl9pPr marL="3657600" indent="0">
+              <a:buNone/>
+              <a:defRPr sz="2000"/>
+            </a:lvl9pPr>
+          </a:lstStyle>
+          <a:p>
+            <a:endParaRPr lang="en-US"/>
+          </a:p>
+        </p:txBody>
+      </p:sp>
+      <p:sp>
+        <p:nvSpPr>
+          <p:cNvPr id="4" name="Text Placeholder 3">
+            <a:extLst>
+              <a:ext uri="{FF2B5EF4-FFF2-40B4-BE49-F238E27FC236}">
+                <a16:creationId xmlns:a16="http://schemas.microsoft.com/office/drawing/2014/main" id="{2197FD60-24D5-39B7-DC1B-2FED8920BBD3}"/>
+              </a:ext>
+            </a:extLst>
+          </p:cNvPr>
+          <p:cNvSpPr>
+            <a:spLocks noGrp="1"/>
+          </p:cNvSpPr>
+          <p:nvPr>
+            <p:ph type="body" sz="half" idx="2"/>
+          </p:nvPr>
+        </p:nvSpPr>
+        <p:spPr>
+          <a:xfrm>
+            <a:off x="839788" y="2057400"/>
+            <a:ext cx="3932237" cy="3811588"/>
+          </a:xfrm>
+        </p:spPr>
+        <p:txBody>
+          <a:bodyPr/>
+          <a:lstStyle>
+            <a:lvl1pPr marL="0" indent="0">
+              <a:buNone/>
+              <a:defRPr sz="1600"/>
+            </a:lvl1pPr>
+            <a:lvl2pPr marL="457200" indent="0">
+              <a:buNone/>
+              <a:defRPr sz="1400"/>
+            </a:lvl2pPr>
+            <a:lvl3pPr marL="914400" indent="0">
+              <a:buNone/>
+              <a:defRPr sz="1200"/>
+            </a:lvl3pPr>
+            <a:lvl4pPr marL="1371600" indent="0">
+              <a:buNone/>
+              <a:defRPr sz="1000"/>
+            </a:lvl4pPr>
+            <a:lvl5pPr marL="1828800" indent="0">
+              <a:buNone/>
+              <a:defRPr sz="1000"/>
+            </a:lvl5pPr>
+            <a:lvl6pPr marL="2286000" indent="0">
+              <a:buNone/>
+              <a:defRPr sz="1000"/>
+            </a:lvl6pPr>
+            <a:lvl7pPr marL="2743200" indent="0">
+              <a:buNone/>
+              <a:defRPr sz="1000"/>
+            </a:lvl7pPr>
+            <a:lvl8pPr marL="3200400" indent="0">
+              <a:buNone/>
+              <a:defRPr sz="1000"/>
+            </a:lvl8pPr>
+            <a:lvl9pPr marL="3657600" indent="0">
+              <a:buNone/>
+              <a:defRPr sz="1000"/>
+            </a:lvl9pPr>
+          </a:lstStyle>
+          <a:p>
+            <a:pPr lvl="0"/>
+            <a:r>
+              <a:rPr lang="en-US"/>
+              <a:t>Click to edit Master text styles</a:t>
+            </a:r>
+          </a:p>
+        </p:txBody>
+      </p:sp>
+    </p:spTree>
+    <p:extLst>
+      <p:ext uri="{BB962C8B-B14F-4D97-AF65-F5344CB8AC3E}">
+        <p14:creationId xmlns:p14="http://schemas.microsoft.com/office/powerpoint/2010/main" val="1497814086"/>
+      </p:ext>
+    </p:extLst>
+  </p:cSld>
+  <p:clrMapOvr>
+    <a:masterClrMapping/>
+  </p:clrMapOvr>
+</p:sldLayout>
+</file>
+
+<file path=ppt/slideLayouts/slideLayout9.xml><?xml version="1.0" encoding="utf-8"?>
+<p:sldLayout xmlns:a="http://schemas.openxmlformats.org/drawingml/2006/main" xmlns:r="http://schemas.openxmlformats.org/officeDocument/2006/relationships" xmlns:p="http://schemas.openxmlformats.org/presentationml/2006/main" type="vertTitleAndTx" preserve="1">
+  <p:cSld name="Vertical Title and Text">
+    <p:spTree>
+      <p:nvGrpSpPr>
+        <p:cNvPr id="1" name=""/>
+        <p:cNvGrpSpPr/>
+        <p:nvPr/>
+      </p:nvGrpSpPr>
+      <p:grpSpPr>
+        <a:xfrm>
+          <a:off x="0" y="0"/>
+          <a:ext cx="0" cy="0"/>
+          <a:chOff x="0" y="0"/>
+          <a:chExt cx="0" cy="0"/>
+        </a:xfrm>
+      </p:grpSpPr>
+      <p:sp>
+        <p:nvSpPr>
+          <p:cNvPr id="2" name="Vertical Title 1">
+            <a:extLst>
+              <a:ext uri="{FF2B5EF4-FFF2-40B4-BE49-F238E27FC236}">
+                <a16:creationId xmlns:a16="http://schemas.microsoft.com/office/drawing/2014/main" id="{F8169180-2057-B874-0C50-E3E91253F2FE}"/>
+              </a:ext>
+            </a:extLst>
+          </p:cNvPr>
+          <p:cNvSpPr>
+            <a:spLocks noGrp="1"/>
+          </p:cNvSpPr>
+          <p:nvPr>
+            <p:ph type="title" orient="vert"/>
+          </p:nvPr>
+        </p:nvSpPr>
+        <p:spPr>
+          <a:xfrm>
+            <a:off x="8724900" y="365125"/>
+            <a:ext cx="2628900" cy="5811838"/>
+          </a:xfrm>
+        </p:spPr>
+        <p:txBody>
+          <a:bodyPr vert="eaVert"/>
+          <a:lstStyle/>
+          <a:p>
+            <a:r>
+              <a:rPr lang="en-US"/>
+              <a:t>Click to edit Master title style</a:t>
+            </a:r>
+          </a:p>
+        </p:txBody>
+      </p:sp>
+      <p:sp>
+        <p:nvSpPr>
+          <p:cNvPr id="3" name="Vertical Text Placeholder 2">
+            <a:extLst>
+              <a:ext uri="{FF2B5EF4-FFF2-40B4-BE49-F238E27FC236}">
+                <a16:creationId xmlns:a16="http://schemas.microsoft.com/office/drawing/2014/main" id="{A25A622A-4020-2C85-318D-6BB2ED722E45}"/>
+              </a:ext>
+            </a:extLst>
+          </p:cNvPr>
+          <p:cNvSpPr>
+            <a:spLocks noGrp="1"/>
+          </p:cNvSpPr>
+          <p:nvPr>
+            <p:ph type="body" orient="vert" idx="1"/>
+          </p:nvPr>
+        </p:nvSpPr>
+        <p:spPr>
+          <a:xfrm>
+            <a:off x="838200" y="365125"/>
+            <a:ext cx="7734300" cy="5811838"/>
+          </a:xfrm>
+        </p:spPr>
+        <p:txBody>
+          <a:bodyPr vert="eaVert"/>
+          <a:lstStyle/>
+          <a:p>
+            <a:pPr lvl="0"/>
+            <a:r>
+              <a:rPr lang="en-US"/>
+              <a:t>Click to edit Master text styles</a:t>
+            </a:r>
+          </a:p>
+          <a:p>
+            <a:pPr lvl="1"/>
+            <a:r>
+              <a:rPr lang="en-US"/>
+              <a:t>Second level</a:t>
+            </a:r>
+          </a:p>
+          <a:p>
+            <a:pPr lvl="2"/>
+            <a:r>
+              <a:rPr lang="en-US"/>
+              <a:t>Third level</a:t>
+            </a:r>
+          </a:p>
+          <a:p>
+            <a:pPr lvl="3"/>
+            <a:r>
+              <a:rPr lang="en-US"/>
+              <a:t>Fourth level</a:t>
+            </a:r>
+          </a:p>
+          <a:p>
+            <a:pPr lvl="4"/>
+            <a:r>
+              <a:rPr lang="en-US"/>
+              <a:t>Fifth level</a:t>
+            </a:r>
+          </a:p>
+        </p:txBody>
+      </p:sp>
+    </p:spTree>
+    <p:extLst>
+      <p:ext uri="{BB962C8B-B14F-4D97-AF65-F5344CB8AC3E}">
+        <p14:creationId xmlns:p14="http://schemas.microsoft.com/office/powerpoint/2010/main" val="1481630023"/>
+      </p:ext>
+    </p:extLst>
+  </p:cSld>
+  <p:clrMapOvr>
+    <a:masterClrMapping/>
+  </p:clrMapOvr>
+</p:sldLayout>
+</file>
+
 <file path=ppt/slideMasters/slideMaster1.xml><?xml version="1.0" encoding="utf-8"?>
 <p:sldMaster xmlns:a="http://schemas.openxmlformats.org/drawingml/2006/main" xmlns:r="http://schemas.openxmlformats.org/officeDocument/2006/relationships" xmlns:p="http://schemas.openxmlformats.org/presentationml/2006/main">
   <p:cSld>
@@ -1775,7 +3114,7 @@
           <p:nvPr userDrawn="1"/>
         </p:nvPicPr>
         <p:blipFill>
-          <a:blip r:embed="rId6">
+          <a:blip r:embed="rId13">
             <a:extLst>
               <a:ext uri="{28A0092B-C50C-407E-A947-70E740481C1C}">
                 <a14:useLocalDpi xmlns:a14="http://schemas.microsoft.com/office/drawing/2010/main" val="0"/>
@@ -1809,6 +3148,13 @@
     <p:sldLayoutId id="2147483662" r:id="rId2"/>
     <p:sldLayoutId id="2147483663" r:id="rId3"/>
     <p:sldLayoutId id="2147483664" r:id="rId4"/>
+    <p:sldLayoutId id="2147483670" r:id="rId5"/>
+    <p:sldLayoutId id="2147483671" r:id="rId6"/>
+    <p:sldLayoutId id="2147483673" r:id="rId7"/>
+    <p:sldLayoutId id="2147483674" r:id="rId8"/>
+    <p:sldLayoutId id="2147483676" r:id="rId9"/>
+    <p:sldLayoutId id="2147483672" r:id="rId10"/>
+    <p:sldLayoutId id="2147483675" r:id="rId11"/>
   </p:sldLayoutIdLst>
   <p:hf hdr="0" ftr="0" dt="0"/>
   <p:txStyles>

</xml_diff>